<commit_message>
Minor changes to lecture slides 07 and 08.
Added Scala and Spark slides.
</commit_message>
<xml_diff>
--- a/lectures/08-performance-evaluation.pptx
+++ b/lectures/08-performance-evaluation.pptx
@@ -251,7 +251,7 @@
           <a:p>
             <a:fld id="{53CD2493-0AFC-45FB-85C8-B9D552CC01B0}" type="datetimeFigureOut">
               <a:rPr lang="en-US" smtClean="0"/>
-              <a:t>9/23/16</a:t>
+              <a:t>9/30/16</a:t>
             </a:fld>
             <a:endParaRPr lang="en-US"/>
           </a:p>
@@ -1621,7 +1621,7 @@
             <a:fld id="{8DF9E8F3-4849-FA48-B4C8-2D894E979956}" type="datetimeFigureOut">
               <a:rPr lang="nn-NO" smtClean="0"/>
               <a:pPr/>
-              <a:t>23.09.2016</a:t>
+              <a:t>30.09.2016</a:t>
             </a:fld>
             <a:endParaRPr lang="nn-NO"/>
           </a:p>
@@ -1906,7 +1906,7 @@
             <a:fld id="{8DF9E8F3-4849-FA48-B4C8-2D894E979956}" type="datetimeFigureOut">
               <a:rPr lang="nn-NO" smtClean="0"/>
               <a:pPr/>
-              <a:t>23.09.2016</a:t>
+              <a:t>30.09.2016</a:t>
             </a:fld>
             <a:endParaRPr lang="nn-NO"/>
           </a:p>
@@ -2021,7 +2021,7 @@
             <a:fld id="{8DF9E8F3-4849-FA48-B4C8-2D894E979956}" type="datetimeFigureOut">
               <a:rPr lang="nn-NO" smtClean="0"/>
               <a:pPr/>
-              <a:t>23.09.2016</a:t>
+              <a:t>30.09.2016</a:t>
             </a:fld>
             <a:endParaRPr lang="nn-NO"/>
           </a:p>
@@ -2171,7 +2171,7 @@
             <a:fld id="{8DF9E8F3-4849-FA48-B4C8-2D894E979956}" type="datetimeFigureOut">
               <a:rPr lang="nn-NO" smtClean="0"/>
               <a:pPr/>
-              <a:t>23.09.2016</a:t>
+              <a:t>30.09.2016</a:t>
             </a:fld>
             <a:endParaRPr lang="nn-NO"/>
           </a:p>
@@ -2263,7 +2263,7 @@
             <a:fld id="{8DF9E8F3-4849-FA48-B4C8-2D894E979956}" type="datetimeFigureOut">
               <a:rPr lang="nn-NO" smtClean="0"/>
               <a:pPr/>
-              <a:t>23.09.2016</a:t>
+              <a:t>30.09.2016</a:t>
             </a:fld>
             <a:endParaRPr lang="nn-NO" dirty="0"/>
           </a:p>
@@ -3090,7 +3090,7 @@
             <a:fld id="{8DF9E8F3-4849-FA48-B4C8-2D894E979956}" type="datetimeFigureOut">
               <a:rPr lang="nn-NO" smtClean="0"/>
               <a:pPr/>
-              <a:t>23.09.2016</a:t>
+              <a:t>30.09.2016</a:t>
             </a:fld>
             <a:endParaRPr lang="nn-NO" dirty="0"/>
           </a:p>
@@ -3664,11 +3664,7 @@
           <a:p>
             <a:r>
               <a:rPr lang="en-US" sz="2000" smtClean="0"/>
-              <a:t>Fall </a:t>
-            </a:r>
-            <a:r>
-              <a:rPr lang="en-US" sz="2000" smtClean="0"/>
-              <a:t>2016</a:t>
+              <a:t>Fall 2016</a:t>
             </a:r>
             <a:endParaRPr lang="en-US" sz="2000" dirty="0" smtClean="0"/>
           </a:p>
@@ -6063,20 +6059,13 @@
             <a:pPr lvl="2"/>
             <a:r>
               <a:rPr lang="en-US" dirty="0" smtClean="0"/>
-              <a:t>Use fractional design</a:t>
-            </a:r>
-          </a:p>
-          <a:p>
-            <a:pPr lvl="1"/>
-            <a:r>
-              <a:rPr lang="en-US" dirty="0"/>
-              <a:t>C</a:t>
-            </a:r>
-            <a:r>
-              <a:rPr lang="en-US" dirty="0" smtClean="0"/>
-              <a:t>ommonly used in systems research</a:t>
-            </a:r>
-            <a:endParaRPr lang="en-US" dirty="0"/>
+              <a:t>Use fractional </a:t>
+            </a:r>
+            <a:r>
+              <a:rPr lang="en-US" dirty="0" smtClean="0"/>
+              <a:t>design</a:t>
+            </a:r>
+            <a:endParaRPr lang="en-US" dirty="0" smtClean="0"/>
           </a:p>
         </p:txBody>
       </p:sp>

</xml_diff>